<commit_message>
Edit experiment naming scheme
</commit_message>
<xml_diff>
--- a/Notes/Procedure schematics.pptx
+++ b/Notes/Procedure schematics.pptx
@@ -106,6 +106,11 @@
       </a:defRPr>
     </a:lvl9pPr>
   </p:defaultTextStyle>
+  <p:extLst>
+    <p:ext uri="{EFAFB233-063F-42B5-8137-9DF3F51BA10A}">
+      <p15:sldGuideLst xmlns:p15="http://schemas.microsoft.com/office/powerpoint/2012/main"/>
+    </p:ext>
+  </p:extLst>
 </p:presentation>
 </file>
 
@@ -3541,7 +3546,7 @@
         </p:nvSpPr>
         <p:spPr>
           <a:xfrm>
-            <a:off x="0" y="109393"/>
+            <a:off x="1892502" y="-162922"/>
             <a:ext cx="2066207" cy="369332"/>
           </a:xfrm>
           <a:prstGeom prst="rect">
@@ -3567,36 +3572,6 @@
           </a:p>
         </p:txBody>
       </p:sp>
-      <p:pic>
-        <p:nvPicPr>
-          <p:cNvPr id="13" name="Picture 12">
-            <a:extLst>
-              <a:ext uri="{FF2B5EF4-FFF2-40B4-BE49-F238E27FC236}">
-                <a16:creationId xmlns:a16="http://schemas.microsoft.com/office/drawing/2014/main" id="{EFC18DB3-D583-41D1-A604-DD750B147638}"/>
-              </a:ext>
-            </a:extLst>
-          </p:cNvPr>
-          <p:cNvPicPr>
-            <a:picLocks noChangeAspect="1"/>
-          </p:cNvPicPr>
-          <p:nvPr/>
-        </p:nvPicPr>
-        <p:blipFill>
-          <a:blip r:embed="rId2"/>
-          <a:stretch>
-            <a:fillRect/>
-          </a:stretch>
-        </p:blipFill>
-        <p:spPr>
-          <a:xfrm>
-            <a:off x="0" y="478725"/>
-            <a:ext cx="12192000" cy="646902"/>
-          </a:xfrm>
-          <a:prstGeom prst="rect">
-            <a:avLst/>
-          </a:prstGeom>
-        </p:spPr>
-      </p:pic>
       <p:cxnSp>
         <p:nvCxnSpPr>
           <p:cNvPr id="21" name="Straight Connector 20">
@@ -3826,6 +3801,7 @@
           <a:prstGeom prst="line">
             <a:avLst/>
           </a:prstGeom>
+          <a:ln w="57150"/>
         </p:spPr>
         <p:style>
           <a:lnRef idx="1">
@@ -4260,7 +4236,7 @@
           <p:nvPr/>
         </p:nvPicPr>
         <p:blipFill>
-          <a:blip r:embed="rId3">
+          <a:blip r:embed="rId2">
             <a:clrChange>
               <a:clrFrom>
                 <a:srgbClr val="FFFFFF"/>
@@ -5769,6 +5745,46 @@
             <a:r>
               <a:rPr lang="und-Latn-001" dirty="0"/>
               <a:t>TEST</a:t>
+            </a:r>
+            <a:endParaRPr lang="en-US" dirty="0"/>
+          </a:p>
+        </p:txBody>
+      </p:sp>
+      <p:sp>
+        <p:nvSpPr>
+          <p:cNvPr id="53" name="TextBox 52">
+            <a:extLst>
+              <a:ext uri="{FF2B5EF4-FFF2-40B4-BE49-F238E27FC236}">
+                <a16:creationId xmlns:a16="http://schemas.microsoft.com/office/drawing/2014/main" id="{0AA92947-778E-4E3C-9F60-26C818E4B986}"/>
+              </a:ext>
+            </a:extLst>
+          </p:cNvPr>
+          <p:cNvSpPr txBox="1"/>
+          <p:nvPr/>
+        </p:nvSpPr>
+        <p:spPr>
+          <a:xfrm>
+            <a:off x="8326267" y="9064"/>
+            <a:ext cx="2077428" cy="369332"/>
+          </a:xfrm>
+          <a:prstGeom prst="rect">
+            <a:avLst/>
+          </a:prstGeom>
+          <a:noFill/>
+        </p:spPr>
+        <p:txBody>
+          <a:bodyPr wrap="none" rtlCol="0">
+            <a:spAutoFit/>
+          </a:bodyPr>
+          <a:lstStyle/>
+          <a:p>
+            <a:r>
+              <a:rPr lang="en-US" dirty="0"/>
+              <a:t>PACT</a:t>
+            </a:r>
+            <a:r>
+              <a:rPr lang="und-Latn-001" dirty="0"/>
+              <a:t> Experiment 1b</a:t>
             </a:r>
             <a:endParaRPr lang="en-US" dirty="0"/>
           </a:p>
@@ -5871,7 +5887,7 @@
         <p:spPr>
           <a:xfrm>
             <a:off x="0" y="109393"/>
-            <a:ext cx="2077428" cy="369332"/>
+            <a:ext cx="2066207" cy="369332"/>
           </a:xfrm>
           <a:prstGeom prst="rect">
             <a:avLst/>
@@ -5890,7 +5906,7 @@
             </a:r>
             <a:r>
               <a:rPr lang="und-Latn-001" dirty="0"/>
-              <a:t> Experiment 1b</a:t>
+              <a:t> Experiment 2a</a:t>
             </a:r>
             <a:endParaRPr lang="en-US" dirty="0"/>
           </a:p>
@@ -6527,42 +6543,6 @@
       </p:sp>
       <p:sp>
         <p:nvSpPr>
-          <p:cNvPr id="2" name="TextBox 1">
-            <a:extLst>
-              <a:ext uri="{FF2B5EF4-FFF2-40B4-BE49-F238E27FC236}">
-                <a16:creationId xmlns:a16="http://schemas.microsoft.com/office/drawing/2014/main" id="{9FDC8244-C134-41B9-AB30-23226C67FB7D}"/>
-              </a:ext>
-            </a:extLst>
-          </p:cNvPr>
-          <p:cNvSpPr txBox="1"/>
-          <p:nvPr/>
-        </p:nvSpPr>
-        <p:spPr>
-          <a:xfrm>
-            <a:off x="-269871" y="422665"/>
-            <a:ext cx="11154015" cy="646331"/>
-          </a:xfrm>
-          <a:prstGeom prst="rect">
-            <a:avLst/>
-          </a:prstGeom>
-          <a:noFill/>
-        </p:spPr>
-        <p:txBody>
-          <a:bodyPr wrap="none" rtlCol="0">
-            <a:spAutoFit/>
-          </a:bodyPr>
-          <a:lstStyle/>
-          <a:p>
-            <a:r>
-              <a:rPr lang="und-Latn-001" sz="3600" dirty="0"/>
-              <a:t>1b-001		     1b-002			1b-003		    1b-004</a:t>
-            </a:r>
-            <a:endParaRPr lang="en-US" sz="3600" dirty="0"/>
-          </a:p>
-        </p:txBody>
-      </p:sp>
-      <p:sp>
-        <p:nvSpPr>
           <p:cNvPr id="53" name="Rectangle 52">
             <a:extLst>
               <a:ext uri="{FF2B5EF4-FFF2-40B4-BE49-F238E27FC236}">
@@ -6858,6 +6838,46 @@
               <a:t>10x7 steps pe</a:t>
             </a:r>
             <a:endParaRPr lang="en-US" sz="1600" dirty="0"/>
+          </a:p>
+        </p:txBody>
+      </p:sp>
+      <p:sp>
+        <p:nvSpPr>
+          <p:cNvPr id="20" name="TextBox 19">
+            <a:extLst>
+              <a:ext uri="{FF2B5EF4-FFF2-40B4-BE49-F238E27FC236}">
+                <a16:creationId xmlns:a16="http://schemas.microsoft.com/office/drawing/2014/main" id="{E9ED55DB-1EED-4368-9AAD-AB7E7D30C6A8}"/>
+              </a:ext>
+            </a:extLst>
+          </p:cNvPr>
+          <p:cNvSpPr txBox="1"/>
+          <p:nvPr/>
+        </p:nvSpPr>
+        <p:spPr>
+          <a:xfrm>
+            <a:off x="6220827" y="-10970"/>
+            <a:ext cx="2077428" cy="369332"/>
+          </a:xfrm>
+          <a:prstGeom prst="rect">
+            <a:avLst/>
+          </a:prstGeom>
+          <a:noFill/>
+        </p:spPr>
+        <p:txBody>
+          <a:bodyPr wrap="none" rtlCol="0">
+            <a:spAutoFit/>
+          </a:bodyPr>
+          <a:lstStyle/>
+          <a:p>
+            <a:r>
+              <a:rPr lang="en-US" dirty="0"/>
+              <a:t>PACT</a:t>
+            </a:r>
+            <a:r>
+              <a:rPr lang="und-Latn-001" dirty="0"/>
+              <a:t> Experiment 2b</a:t>
+            </a:r>
+            <a:endParaRPr lang="en-US" dirty="0"/>
           </a:p>
         </p:txBody>
       </p:sp>

</xml_diff>